<commit_message>
Added support for different machines
</commit_message>
<xml_diff>
--- a/Songs/Ancient Of Days/Ancient Of Days.pptx
+++ b/Songs/Ancient Of Days/Ancient Of Days.pptx
@@ -5,19 +5,20 @@
     <p:sldMasterId id="2147483681" r:id="rId1"/>
   </p:sldMasterIdLst>
   <p:notesMasterIdLst>
-    <p:notesMasterId r:id="rId12"/>
+    <p:notesMasterId r:id="rId13"/>
   </p:notesMasterIdLst>
   <p:sldIdLst>
     <p:sldId id="261" r:id="rId2"/>
     <p:sldId id="259" r:id="rId3"/>
-    <p:sldId id="468" r:id="rId4"/>
-    <p:sldId id="470" r:id="rId5"/>
-    <p:sldId id="356" r:id="rId6"/>
-    <p:sldId id="357" r:id="rId7"/>
-    <p:sldId id="478" r:id="rId8"/>
+    <p:sldId id="356" r:id="rId4"/>
+    <p:sldId id="479" r:id="rId5"/>
+    <p:sldId id="357" r:id="rId6"/>
+    <p:sldId id="480" r:id="rId7"/>
+    <p:sldId id="481" r:id="rId8"/>
     <p:sldId id="359" r:id="rId9"/>
-    <p:sldId id="476" r:id="rId10"/>
-    <p:sldId id="477" r:id="rId11"/>
+    <p:sldId id="482" r:id="rId10"/>
+    <p:sldId id="483" r:id="rId11"/>
+    <p:sldId id="477" r:id="rId12"/>
   </p:sldIdLst>
   <p:sldSz cx="12192000" cy="6858000"/>
   <p:notesSz cx="6858000" cy="9144000"/>
@@ -206,7 +207,7 @@
           <a:p>
             <a:fld id="{A9384D19-4441-405A-A897-182ECCA016BA}" type="datetimeFigureOut">
               <a:rPr lang="en-AU" smtClean="0"/>
-              <a:t>27/10/2023</a:t>
+              <a:t>18/11/2023</a:t>
             </a:fld>
             <a:endParaRPr lang="en-AU"/>
           </a:p>
@@ -677,7 +678,7 @@
     </p:spTree>
     <p:extLst>
       <p:ext uri="{BB962C8B-B14F-4D97-AF65-F5344CB8AC3E}">
-        <p14:creationId xmlns:p14="http://schemas.microsoft.com/office/powerpoint/2010/main" val="2231203908"/>
+        <p14:creationId xmlns:p14="http://schemas.microsoft.com/office/powerpoint/2010/main" val="1715554475"/>
       </p:ext>
     </p:extLst>
   </p:cSld>
@@ -687,7 +688,7 @@
 </p:notes>
 </file>
 
-<file path=ppt/notesSlides/notesSlide2.xml><?xml version="1.0" encoding="utf-8"?>
+<file path=ppt/notesSlides/notesSlide11.xml><?xml version="1.0" encoding="utf-8"?>
 <p:notes xmlns:a="http://schemas.openxmlformats.org/drawingml/2006/main" xmlns:r="http://schemas.openxmlformats.org/officeDocument/2006/relationships" xmlns:p="http://schemas.openxmlformats.org/presentationml/2006/main" showMasterSp="0" showMasterPhAnim="0">
   <p:cSld>
     <p:spTree>
@@ -784,6 +785,11 @@
         </p:txBody>
       </p:sp>
     </p:spTree>
+    <p:extLst>
+      <p:ext uri="{BB962C8B-B14F-4D97-AF65-F5344CB8AC3E}">
+        <p14:creationId xmlns:p14="http://schemas.microsoft.com/office/powerpoint/2010/main" val="2231203908"/>
+      </p:ext>
+    </p:extLst>
   </p:cSld>
   <p:clrMapOvr>
     <a:masterClrMapping/>
@@ -791,7 +797,7 @@
 </p:notes>
 </file>
 
-<file path=ppt/notesSlides/notesSlide3.xml><?xml version="1.0" encoding="utf-8"?>
+<file path=ppt/notesSlides/notesSlide2.xml><?xml version="1.0" encoding="utf-8"?>
 <p:notes xmlns:a="http://schemas.openxmlformats.org/drawingml/2006/main" xmlns:r="http://schemas.openxmlformats.org/officeDocument/2006/relationships" xmlns:p="http://schemas.openxmlformats.org/presentationml/2006/main" showMasterSp="0" showMasterPhAnim="0">
   <p:cSld>
     <p:spTree>
@@ -888,11 +894,6 @@
         </p:txBody>
       </p:sp>
     </p:spTree>
-    <p:extLst>
-      <p:ext uri="{BB962C8B-B14F-4D97-AF65-F5344CB8AC3E}">
-        <p14:creationId xmlns:p14="http://schemas.microsoft.com/office/powerpoint/2010/main" val="3507737791"/>
-      </p:ext>
-    </p:extLst>
   </p:cSld>
   <p:clrMapOvr>
     <a:masterClrMapping/>
@@ -900,7 +901,7 @@
 </p:notes>
 </file>
 
-<file path=ppt/notesSlides/notesSlide4.xml><?xml version="1.0" encoding="utf-8"?>
+<file path=ppt/notesSlides/notesSlide3.xml><?xml version="1.0" encoding="utf-8"?>
 <p:notes xmlns:a="http://schemas.openxmlformats.org/drawingml/2006/main" xmlns:r="http://schemas.openxmlformats.org/officeDocument/2006/relationships" xmlns:p="http://schemas.openxmlformats.org/presentationml/2006/main" showMasterSp="0" showMasterPhAnim="0">
   <p:cSld>
     <p:spTree>
@@ -999,7 +1000,7 @@
     </p:spTree>
     <p:extLst>
       <p:ext uri="{BB962C8B-B14F-4D97-AF65-F5344CB8AC3E}">
-        <p14:creationId xmlns:p14="http://schemas.microsoft.com/office/powerpoint/2010/main" val="2608113703"/>
+        <p14:creationId xmlns:p14="http://schemas.microsoft.com/office/powerpoint/2010/main" val="12261583"/>
       </p:ext>
     </p:extLst>
   </p:cSld>
@@ -1009,7 +1010,7 @@
 </p:notes>
 </file>
 
-<file path=ppt/notesSlides/notesSlide5.xml><?xml version="1.0" encoding="utf-8"?>
+<file path=ppt/notesSlides/notesSlide4.xml><?xml version="1.0" encoding="utf-8"?>
 <p:notes xmlns:a="http://schemas.openxmlformats.org/drawingml/2006/main" xmlns:r="http://schemas.openxmlformats.org/officeDocument/2006/relationships" xmlns:p="http://schemas.openxmlformats.org/presentationml/2006/main" showMasterSp="0" showMasterPhAnim="0">
   <p:cSld>
     <p:spTree>
@@ -1108,7 +1109,7 @@
     </p:spTree>
     <p:extLst>
       <p:ext uri="{BB962C8B-B14F-4D97-AF65-F5344CB8AC3E}">
-        <p14:creationId xmlns:p14="http://schemas.microsoft.com/office/powerpoint/2010/main" val="12261583"/>
+        <p14:creationId xmlns:p14="http://schemas.microsoft.com/office/powerpoint/2010/main" val="656894519"/>
       </p:ext>
     </p:extLst>
   </p:cSld>
@@ -1118,7 +1119,7 @@
 </p:notes>
 </file>
 
-<file path=ppt/notesSlides/notesSlide6.xml><?xml version="1.0" encoding="utf-8"?>
+<file path=ppt/notesSlides/notesSlide5.xml><?xml version="1.0" encoding="utf-8"?>
 <p:notes xmlns:a="http://schemas.openxmlformats.org/drawingml/2006/main" xmlns:r="http://schemas.openxmlformats.org/officeDocument/2006/relationships" xmlns:p="http://schemas.openxmlformats.org/presentationml/2006/main" showMasterSp="0" showMasterPhAnim="0">
   <p:cSld>
     <p:spTree>
@@ -1227,7 +1228,7 @@
 </p:notes>
 </file>
 
-<file path=ppt/notesSlides/notesSlide7.xml><?xml version="1.0" encoding="utf-8"?>
+<file path=ppt/notesSlides/notesSlide6.xml><?xml version="1.0" encoding="utf-8"?>
 <p:notes xmlns:a="http://schemas.openxmlformats.org/drawingml/2006/main" xmlns:r="http://schemas.openxmlformats.org/officeDocument/2006/relationships" xmlns:p="http://schemas.openxmlformats.org/presentationml/2006/main" showMasterSp="0" showMasterPhAnim="0">
   <p:cSld>
     <p:spTree>
@@ -1326,7 +1327,7 @@
     </p:spTree>
     <p:extLst>
       <p:ext uri="{BB962C8B-B14F-4D97-AF65-F5344CB8AC3E}">
-        <p14:creationId xmlns:p14="http://schemas.microsoft.com/office/powerpoint/2010/main" val="1702113226"/>
+        <p14:creationId xmlns:p14="http://schemas.microsoft.com/office/powerpoint/2010/main" val="1567704773"/>
       </p:ext>
     </p:extLst>
   </p:cSld>
@@ -1336,7 +1337,7 @@
 </p:notes>
 </file>
 
-<file path=ppt/notesSlides/notesSlide8.xml><?xml version="1.0" encoding="utf-8"?>
+<file path=ppt/notesSlides/notesSlide7.xml><?xml version="1.0" encoding="utf-8"?>
 <p:notes xmlns:a="http://schemas.openxmlformats.org/drawingml/2006/main" xmlns:r="http://schemas.openxmlformats.org/officeDocument/2006/relationships" xmlns:p="http://schemas.openxmlformats.org/presentationml/2006/main" showMasterSp="0" showMasterPhAnim="0">
   <p:cSld>
     <p:spTree>
@@ -1435,7 +1436,7 @@
     </p:spTree>
     <p:extLst>
       <p:ext uri="{BB962C8B-B14F-4D97-AF65-F5344CB8AC3E}">
-        <p14:creationId xmlns:p14="http://schemas.microsoft.com/office/powerpoint/2010/main" val="665822329"/>
+        <p14:creationId xmlns:p14="http://schemas.microsoft.com/office/powerpoint/2010/main" val="3957783555"/>
       </p:ext>
     </p:extLst>
   </p:cSld>
@@ -1445,7 +1446,7 @@
 </p:notes>
 </file>
 
-<file path=ppt/notesSlides/notesSlide9.xml><?xml version="1.0" encoding="utf-8"?>
+<file path=ppt/notesSlides/notesSlide8.xml><?xml version="1.0" encoding="utf-8"?>
 <p:notes xmlns:a="http://schemas.openxmlformats.org/drawingml/2006/main" xmlns:r="http://schemas.openxmlformats.org/officeDocument/2006/relationships" xmlns:p="http://schemas.openxmlformats.org/presentationml/2006/main" showMasterSp="0" showMasterPhAnim="0">
   <p:cSld>
     <p:spTree>
@@ -1544,7 +1545,116 @@
     </p:spTree>
     <p:extLst>
       <p:ext uri="{BB962C8B-B14F-4D97-AF65-F5344CB8AC3E}">
-        <p14:creationId xmlns:p14="http://schemas.microsoft.com/office/powerpoint/2010/main" val="552657131"/>
+        <p14:creationId xmlns:p14="http://schemas.microsoft.com/office/powerpoint/2010/main" val="665822329"/>
+      </p:ext>
+    </p:extLst>
+  </p:cSld>
+  <p:clrMapOvr>
+    <a:masterClrMapping/>
+  </p:clrMapOvr>
+</p:notes>
+</file>
+
+<file path=ppt/notesSlides/notesSlide9.xml><?xml version="1.0" encoding="utf-8"?>
+<p:notes xmlns:a="http://schemas.openxmlformats.org/drawingml/2006/main" xmlns:r="http://schemas.openxmlformats.org/officeDocument/2006/relationships" xmlns:p="http://schemas.openxmlformats.org/presentationml/2006/main" showMasterSp="0" showMasterPhAnim="0">
+  <p:cSld>
+    <p:spTree>
+      <p:nvGrpSpPr>
+        <p:cNvPr id="1" name="Shape 1059"/>
+        <p:cNvGrpSpPr/>
+        <p:nvPr/>
+      </p:nvGrpSpPr>
+      <p:grpSpPr>
+        <a:xfrm>
+          <a:off x="0" y="0"/>
+          <a:ext cx="0" cy="0"/>
+          <a:chOff x="0" y="0"/>
+          <a:chExt cx="0" cy="0"/>
+        </a:xfrm>
+      </p:grpSpPr>
+      <p:sp>
+        <p:nvSpPr>
+          <p:cNvPr id="1060" name="Google Shape;1060;g1161f6db217_0_321:notes"/>
+          <p:cNvSpPr>
+            <a:spLocks noGrp="1" noRot="1" noChangeAspect="1"/>
+          </p:cNvSpPr>
+          <p:nvPr>
+            <p:ph type="sldImg" idx="2"/>
+          </p:nvPr>
+        </p:nvSpPr>
+        <p:spPr>
+          <a:xfrm>
+            <a:off x="381000" y="685800"/>
+            <a:ext cx="6096000" cy="3429000"/>
+          </a:xfrm>
+          <a:custGeom>
+            <a:avLst/>
+            <a:gdLst/>
+            <a:ahLst/>
+            <a:cxnLst/>
+            <a:rect l="l" t="t" r="r" b="b"/>
+            <a:pathLst>
+              <a:path w="120000" h="120000" extrusionOk="0">
+                <a:moveTo>
+                  <a:pt x="0" y="0"/>
+                </a:moveTo>
+                <a:lnTo>
+                  <a:pt x="120000" y="0"/>
+                </a:lnTo>
+                <a:lnTo>
+                  <a:pt x="120000" y="120000"/>
+                </a:lnTo>
+                <a:lnTo>
+                  <a:pt x="0" y="120000"/>
+                </a:lnTo>
+                <a:close/>
+              </a:path>
+            </a:pathLst>
+          </a:custGeom>
+        </p:spPr>
+      </p:sp>
+      <p:sp>
+        <p:nvSpPr>
+          <p:cNvPr id="1061" name="Google Shape;1061;g1161f6db217_0_321:notes"/>
+          <p:cNvSpPr txBox="1">
+            <a:spLocks noGrp="1"/>
+          </p:cNvSpPr>
+          <p:nvPr>
+            <p:ph type="body" idx="1"/>
+          </p:nvPr>
+        </p:nvSpPr>
+        <p:spPr>
+          <a:xfrm>
+            <a:off x="685800" y="4343400"/>
+            <a:ext cx="5486400" cy="4114800"/>
+          </a:xfrm>
+          <a:prstGeom prst="rect">
+            <a:avLst/>
+          </a:prstGeom>
+        </p:spPr>
+        <p:txBody>
+          <a:bodyPr spcFirstLastPara="1" wrap="square" lIns="91425" tIns="91425" rIns="91425" bIns="91425" anchor="t" anchorCtr="0">
+            <a:noAutofit/>
+          </a:bodyPr>
+          <a:lstStyle/>
+          <a:p>
+            <a:pPr marL="0" lvl="0" indent="0" algn="l" rtl="0">
+              <a:spcBef>
+                <a:spcPts val="0"/>
+              </a:spcBef>
+              <a:spcAft>
+                <a:spcPts val="0"/>
+              </a:spcAft>
+              <a:buNone/>
+            </a:pPr>
+            <a:endParaRPr/>
+          </a:p>
+        </p:txBody>
+      </p:sp>
+    </p:spTree>
+    <p:extLst>
+      <p:ext uri="{BB962C8B-B14F-4D97-AF65-F5344CB8AC3E}">
+        <p14:creationId xmlns:p14="http://schemas.microsoft.com/office/powerpoint/2010/main" val="2613744136"/>
       </p:ext>
     </p:extLst>
   </p:cSld>
@@ -1717,7 +1827,7 @@
           <a:p>
             <a:fld id="{1160EA64-D806-43AC-9DF2-F8C432F32B4C}" type="datetimeFigureOut">
               <a:rPr lang="en-US" dirty="0"/>
-              <a:t>10/27/23</a:t>
+              <a:t>11/18/23</a:t>
             </a:fld>
             <a:endParaRPr lang="en-US" dirty="0"/>
           </a:p>
@@ -1889,7 +1999,7 @@
           <a:p>
             <a:fld id="{E9F9C37B-1D36-470B-8223-D6C91242EC14}" type="datetimeFigureOut">
               <a:rPr lang="en-US" dirty="0"/>
-              <a:t>10/27/23</a:t>
+              <a:t>11/18/23</a:t>
             </a:fld>
             <a:endParaRPr lang="en-US" dirty="0"/>
           </a:p>
@@ -2070,7 +2180,7 @@
           <a:p>
             <a:fld id="{67C6F52A-A82B-47A2-A83A-8C4C91F2D59F}" type="datetimeFigureOut">
               <a:rPr lang="en-US" dirty="0"/>
-              <a:t>10/27/23</a:t>
+              <a:t>11/18/23</a:t>
             </a:fld>
             <a:endParaRPr lang="en-US" dirty="0"/>
           </a:p>
@@ -5852,7 +5962,7 @@
           <a:p>
             <a:fld id="{F070A7B3-6521-4DCA-87E5-044747A908C1}" type="datetimeFigureOut">
               <a:rPr lang="en-US" dirty="0"/>
-              <a:t>10/27/23</a:t>
+              <a:t>11/18/23</a:t>
             </a:fld>
             <a:endParaRPr lang="en-US" dirty="0"/>
           </a:p>
@@ -6122,7 +6232,7 @@
           <a:p>
             <a:fld id="{1160EA64-D806-43AC-9DF2-F8C432F32B4C}" type="datetimeFigureOut">
               <a:rPr lang="en-US" dirty="0"/>
-              <a:t>10/27/23</a:t>
+              <a:t>11/18/23</a:t>
             </a:fld>
             <a:endParaRPr lang="en-US" dirty="0"/>
           </a:p>
@@ -6356,7 +6466,7 @@
           <a:p>
             <a:fld id="{AB134690-1557-4C89-A502-4959FE7FAD70}" type="datetimeFigureOut">
               <a:rPr lang="en-US" dirty="0"/>
-              <a:t>10/27/23</a:t>
+              <a:t>11/18/23</a:t>
             </a:fld>
             <a:endParaRPr lang="en-US" dirty="0"/>
           </a:p>
@@ -6716,7 +6826,7 @@
           <a:p>
             <a:fld id="{4F7D4976-E339-4826-83B7-FBD03F55ECF8}" type="datetimeFigureOut">
               <a:rPr lang="en-US" dirty="0"/>
-              <a:t>10/27/23</a:t>
+              <a:t>11/18/23</a:t>
             </a:fld>
             <a:endParaRPr lang="en-US" dirty="0"/>
           </a:p>
@@ -6858,7 +6968,7 @@
           <a:p>
             <a:fld id="{E1037C31-9E7A-4F99-8774-A0E530DE1A42}" type="datetimeFigureOut">
               <a:rPr lang="en-US" dirty="0"/>
-              <a:t>10/27/23</a:t>
+              <a:t>11/18/23</a:t>
             </a:fld>
             <a:endParaRPr lang="en-US" dirty="0"/>
           </a:p>
@@ -6954,7 +7064,7 @@
           <a:p>
             <a:fld id="{C278504F-A551-4DE0-9316-4DCD1D8CC752}" type="datetimeFigureOut">
               <a:rPr lang="en-US" dirty="0"/>
-              <a:t>10/27/23</a:t>
+              <a:t>11/18/23</a:t>
             </a:fld>
             <a:endParaRPr lang="en-US" dirty="0"/>
           </a:p>
@@ -7311,7 +7421,7 @@
           <a:p>
             <a:fld id="{D1BE4249-C0D0-4B06-8692-E8BB871AF643}" type="datetimeFigureOut">
               <a:rPr lang="en-US" dirty="0"/>
-              <a:t>10/27/23</a:t>
+              <a:t>11/18/23</a:t>
             </a:fld>
             <a:endParaRPr lang="en-US" dirty="0"/>
           </a:p>
@@ -7669,7 +7779,7 @@
           <a:p>
             <a:fld id="{042B0DB6-F5C7-45FB-8CF3-31B45F9C2DAC}" type="datetimeFigureOut">
               <a:rPr lang="en-US" dirty="0"/>
-              <a:t>10/27/23</a:t>
+              <a:t>11/18/23</a:t>
             </a:fld>
             <a:endParaRPr lang="en-US" dirty="0"/>
           </a:p>
@@ -7912,7 +8022,7 @@
           <a:p>
             <a:fld id="{1160EA64-D806-43AC-9DF2-F8C432F32B4C}" type="datetimeFigureOut">
               <a:rPr lang="en-US" dirty="0"/>
-              <a:t>10/27/23</a:t>
+              <a:t>11/18/23</a:t>
             </a:fld>
             <a:endParaRPr lang="en-US" dirty="0"/>
           </a:p>
@@ -8354,6 +8464,14 @@
 <file path=ppt/slides/slide1.xml><?xml version="1.0" encoding="utf-8"?>
 <p:sld xmlns:a="http://schemas.openxmlformats.org/drawingml/2006/main" xmlns:r="http://schemas.openxmlformats.org/officeDocument/2006/relationships" xmlns:p="http://schemas.openxmlformats.org/presentationml/2006/main">
   <p:cSld>
+    <p:bg>
+      <p:bgPr>
+        <a:solidFill>
+          <a:schemeClr val="accent2"/>
+        </a:solidFill>
+        <a:effectLst/>
+      </p:bgPr>
+    </p:bg>
     <p:spTree>
       <p:nvGrpSpPr>
         <p:cNvPr id="1" name="Shape 1089"/>
@@ -8368,73 +8486,120 @@
           <a:chExt cx="0" cy="0"/>
         </a:xfrm>
       </p:grpSpPr>
-      <p:sp>
-        <p:nvSpPr>
-          <p:cNvPr id="1090" name="Google Shape;1090;p79"/>
-          <p:cNvSpPr txBox="1">
-            <a:spLocks noGrp="1"/>
-          </p:cNvSpPr>
-          <p:nvPr>
-            <p:ph type="title"/>
-          </p:nvPr>
-        </p:nvSpPr>
+      <p:pic>
+        <p:nvPicPr>
+          <p:cNvPr id="1093" name="Picture 1092" descr="Metal armor suit">
+            <a:extLst>
+              <a:ext uri="{FF2B5EF4-FFF2-40B4-BE49-F238E27FC236}">
+                <a16:creationId xmlns:a16="http://schemas.microsoft.com/office/drawing/2014/main" id="{54F03F2E-DFC0-0250-6A60-9AF10728CC42}"/>
+              </a:ext>
+            </a:extLst>
+          </p:cNvPr>
+          <p:cNvPicPr>
+            <a:picLocks noChangeAspect="1"/>
+          </p:cNvPicPr>
+          <p:nvPr/>
+        </p:nvPicPr>
+        <p:blipFill rotWithShape="1">
+          <a:blip r:embed="rId3"/>
+          <a:srcRect t="5210" b="29288"/>
+          <a:stretch/>
+        </p:blipFill>
         <p:spPr>
-          <a:xfrm flipH="1">
-            <a:off x="992362" y="2298648"/>
-            <a:ext cx="9883303" cy="1414400"/>
+          <a:xfrm>
+            <a:off x="20" y="10"/>
+            <a:ext cx="12191980" cy="4571990"/>
           </a:xfrm>
           <a:prstGeom prst="rect">
             <a:avLst/>
           </a:prstGeom>
         </p:spPr>
-        <p:txBody>
-          <a:bodyPr spcFirstLastPara="1" wrap="square" lIns="121900" tIns="121900" rIns="121900" bIns="121900" anchor="t" anchorCtr="0">
-            <a:noAutofit/>
-          </a:bodyPr>
-          <a:lstStyle/>
-          <a:p>
-            <a:pPr lvl="0"/>
-            <a:r>
-              <a:rPr lang="en-US" dirty="0"/>
-              <a:t>Template</a:t>
-            </a:r>
-            <a:endParaRPr dirty="0"/>
-          </a:p>
-        </p:txBody>
-      </p:sp>
-      <p:sp>
-        <p:nvSpPr>
-          <p:cNvPr id="1091" name="Google Shape;1091;p79"/>
+      </p:pic>
+      <p:sp>
+        <p:nvSpPr>
+          <p:cNvPr id="1090" name="Google Shape;1090;p79"/>
           <p:cNvSpPr txBox="1">
             <a:spLocks noGrp="1"/>
           </p:cNvSpPr>
           <p:nvPr>
-            <p:ph type="body" idx="1"/>
+            <p:ph type="title"/>
           </p:nvPr>
         </p:nvSpPr>
         <p:spPr>
-          <a:xfrm flipH="1">
-            <a:off x="1154347" y="3713048"/>
-            <a:ext cx="9559331" cy="1269627"/>
+          <a:xfrm>
+            <a:off x="1600200" y="3753529"/>
+            <a:ext cx="8991600" cy="1645759"/>
           </a:xfrm>
           <a:prstGeom prst="rect">
             <a:avLst/>
           </a:prstGeom>
         </p:spPr>
         <p:txBody>
-          <a:bodyPr spcFirstLastPara="1" wrap="square" lIns="121900" tIns="121900" rIns="121900" bIns="121900" anchor="t" anchorCtr="0">
-            <a:noAutofit/>
+          <a:bodyPr spcFirstLastPara="1" vert="horz" lIns="274320" tIns="182880" rIns="274320" bIns="182880" rtlCol="0" anchor="ctr" anchorCtr="1">
+            <a:normAutofit/>
           </a:bodyPr>
           <a:lstStyle/>
           <a:p>
+            <a:pPr lvl="0">
+              <a:lnSpc>
+                <a:spcPct val="90000"/>
+              </a:lnSpc>
+              <a:spcBef>
+                <a:spcPct val="0"/>
+              </a:spcBef>
+            </a:pPr>
+            <a:r>
+              <a:rPr lang="en-US" sz="3800" dirty="0"/>
+              <a:t>Ancient of Days</a:t>
+            </a:r>
+          </a:p>
+        </p:txBody>
+      </p:sp>
+      <p:sp>
+        <p:nvSpPr>
+          <p:cNvPr id="1091" name="Google Shape;1091;p79"/>
+          <p:cNvSpPr txBox="1">
+            <a:spLocks noGrp="1"/>
+          </p:cNvSpPr>
+          <p:nvPr>
+            <p:ph type="body" idx="1"/>
+          </p:nvPr>
+        </p:nvSpPr>
+        <p:spPr>
+          <a:xfrm>
+            <a:off x="2695194" y="5704731"/>
+            <a:ext cx="6801612" cy="513189"/>
+          </a:xfrm>
+          <a:prstGeom prst="rect">
+            <a:avLst/>
+          </a:prstGeom>
+        </p:spPr>
+        <p:txBody>
+          <a:bodyPr spcFirstLastPara="1" vert="horz" lIns="91440" tIns="45720" rIns="91440" bIns="45720" rtlCol="0" anchorCtr="0">
+            <a:normAutofit/>
+          </a:bodyPr>
+          <a:lstStyle/>
+          <a:p>
             <a:pPr marL="0" indent="0">
+              <a:lnSpc>
+                <a:spcPct val="90000"/>
+              </a:lnSpc>
+              <a:spcBef>
+                <a:spcPts val="1000"/>
+              </a:spcBef>
               <a:buNone/>
             </a:pPr>
             <a:r>
-              <a:rPr lang="en-US" sz="1467" dirty="0"/>
+              <a:rPr lang="en-US" sz="2000">
+                <a:solidFill>
+                  <a:schemeClr val="tx1">
+                    <a:lumMod val="75000"/>
+                    <a:lumOff val="25000"/>
+                  </a:schemeClr>
+                </a:solidFill>
+              </a:rPr>
               <a:t>CCLI</a:t>
             </a:r>
-            <a:endParaRPr sz="1467" dirty="0"/>
           </a:p>
         </p:txBody>
       </p:sp>
@@ -8641,9 +8806,103 @@
           <a:p>
             <a:pPr marL="0" indent="0"/>
             <a:r>
-              <a:rPr lang="en-US" sz="4267"/>
+              <a:rPr lang="en-US" sz="4267" dirty="0"/>
+              <a:t>Chorus </a:t>
+            </a:r>
+          </a:p>
+          <a:p>
+            <a:pPr marL="0" indent="0"/>
+            <a:r>
+              <a:rPr lang="en-US" sz="4267" dirty="0"/>
+              <a:t>All the power, all the glory</a:t>
+            </a:r>
+          </a:p>
+          <a:p>
+            <a:pPr marL="0" indent="0"/>
+            <a:r>
+              <a:rPr lang="en-US" sz="4267" dirty="0"/>
+              <a:t>I will trust in His name</a:t>
+            </a:r>
+          </a:p>
+          <a:p>
+            <a:pPr marL="0" indent="0"/>
+            <a:r>
+              <a:rPr lang="en-US" sz="4267" dirty="0"/>
+              <a:t>For my God is, the Ancient of Days</a:t>
+            </a:r>
+          </a:p>
+        </p:txBody>
+      </p:sp>
+    </p:spTree>
+    <p:extLst>
+      <p:ext uri="{BB962C8B-B14F-4D97-AF65-F5344CB8AC3E}">
+        <p14:creationId xmlns:p14="http://schemas.microsoft.com/office/powerpoint/2010/main" val="2664838727"/>
+      </p:ext>
+    </p:extLst>
+  </p:cSld>
+  <p:clrMapOvr>
+    <a:masterClrMapping/>
+  </p:clrMapOvr>
+</p:sld>
+</file>
+
+<file path=ppt/slides/slide11.xml><?xml version="1.0" encoding="utf-8"?>
+<p:sld xmlns:a="http://schemas.openxmlformats.org/drawingml/2006/main" xmlns:r="http://schemas.openxmlformats.org/officeDocument/2006/relationships" xmlns:p="http://schemas.openxmlformats.org/presentationml/2006/main">
+  <p:cSld>
+    <p:spTree>
+      <p:nvGrpSpPr>
+        <p:cNvPr id="1" name="Shape 1062"/>
+        <p:cNvGrpSpPr/>
+        <p:nvPr/>
+      </p:nvGrpSpPr>
+      <p:grpSpPr>
+        <a:xfrm>
+          <a:off x="0" y="0"/>
+          <a:ext cx="0" cy="0"/>
+          <a:chOff x="0" y="0"/>
+          <a:chExt cx="0" cy="0"/>
+        </a:xfrm>
+      </p:grpSpPr>
+      <p:sp>
+        <p:nvSpPr>
+          <p:cNvPr id="1072" name="Google Shape;1072;p77"/>
+          <p:cNvSpPr txBox="1">
+            <a:spLocks noGrp="1"/>
+          </p:cNvSpPr>
+          <p:nvPr>
+            <p:ph type="subTitle" idx="1"/>
+          </p:nvPr>
+        </p:nvSpPr>
+        <p:spPr>
+          <a:xfrm>
+            <a:off x="295073" y="329119"/>
+            <a:ext cx="11601855" cy="6199763"/>
+          </a:xfrm>
+          <a:prstGeom prst="rect">
+            <a:avLst/>
+          </a:prstGeom>
+        </p:spPr>
+        <p:txBody>
+          <a:bodyPr spcFirstLastPara="1" wrap="square" lIns="121900" tIns="121900" rIns="121900" bIns="121900" anchor="t" anchorCtr="0">
+            <a:noAutofit/>
+          </a:bodyPr>
+          <a:lstStyle/>
+          <a:p>
+            <a:pPr marL="0" indent="0"/>
+            <a:r>
+              <a:rPr lang="en-US" sz="4267" dirty="0"/>
               <a:t>Tag</a:t>
             </a:r>
+          </a:p>
+          <a:p>
+            <a:pPr marL="0" indent="0"/>
+            <a:r>
+              <a:rPr lang="en-US" sz="4267" dirty="0"/>
+              <a:t>For my God is, the Ancient of Days</a:t>
+            </a:r>
+          </a:p>
+          <a:p>
+            <a:pPr marL="0" indent="0"/>
             <a:endParaRPr lang="en-US" sz="4267" dirty="0"/>
           </a:p>
         </p:txBody>
@@ -8706,7 +8965,35 @@
             <a:pPr marL="0" indent="0"/>
             <a:r>
               <a:rPr lang="en-US" sz="4267" dirty="0"/>
-              <a:t>Verse 1 </a:t>
+              <a:t>Verse 1</a:t>
+            </a:r>
+          </a:p>
+          <a:p>
+            <a:pPr marL="0" indent="0"/>
+            <a:r>
+              <a:rPr lang="en-US" sz="4267" dirty="0"/>
+              <a:t>Though the nations rage, kingdoms rise and fall</a:t>
+            </a:r>
+          </a:p>
+          <a:p>
+            <a:pPr marL="0" indent="0"/>
+            <a:r>
+              <a:rPr lang="en-US" sz="4267" dirty="0"/>
+              <a:t>There is still one King reigning over all</a:t>
+            </a:r>
+          </a:p>
+          <a:p>
+            <a:pPr marL="0" indent="0"/>
+            <a:r>
+              <a:rPr lang="en-US" sz="4267" dirty="0"/>
+              <a:t>So I will not fear for this truth remains:</a:t>
+            </a:r>
+          </a:p>
+          <a:p>
+            <a:pPr marL="0" indent="0"/>
+            <a:r>
+              <a:rPr lang="en-US" sz="4267" dirty="0"/>
+              <a:t>That my God is, the Ancient of Days </a:t>
             </a:r>
           </a:p>
         </p:txBody>
@@ -8748,7 +9035,7 @@
         </p:nvSpPr>
         <p:spPr>
           <a:xfrm>
-            <a:off x="304801" y="369651"/>
+            <a:off x="295073" y="329119"/>
             <a:ext cx="11601855" cy="6199763"/>
           </a:xfrm>
           <a:prstGeom prst="rect">
@@ -8764,7 +9051,28 @@
             <a:pPr marL="0" indent="0"/>
             <a:r>
               <a:rPr lang="en-US" sz="4267" dirty="0"/>
-              <a:t>Verse 1 </a:t>
+              <a:t>Chorus </a:t>
+            </a:r>
+          </a:p>
+          <a:p>
+            <a:pPr marL="0" indent="0"/>
+            <a:r>
+              <a:rPr lang="en-US" sz="4267" dirty="0"/>
+              <a:t>None above Him, none before Him</a:t>
+            </a:r>
+          </a:p>
+          <a:p>
+            <a:pPr marL="0" indent="0"/>
+            <a:r>
+              <a:rPr lang="en-US" sz="4267" dirty="0"/>
+              <a:t>All of time in His hands</a:t>
+            </a:r>
+          </a:p>
+          <a:p>
+            <a:pPr marL="0" indent="0"/>
+            <a:r>
+              <a:rPr lang="en-US" sz="4267" dirty="0"/>
+              <a:t>For His throne it shall remain and ever stand</a:t>
             </a:r>
           </a:p>
         </p:txBody>
@@ -8772,7 +9080,7 @@
     </p:spTree>
     <p:extLst>
       <p:ext uri="{BB962C8B-B14F-4D97-AF65-F5344CB8AC3E}">
-        <p14:creationId xmlns:p14="http://schemas.microsoft.com/office/powerpoint/2010/main" val="3438436974"/>
+        <p14:creationId xmlns:p14="http://schemas.microsoft.com/office/powerpoint/2010/main" val="1616820011"/>
       </p:ext>
     </p:extLst>
   </p:cSld>
@@ -8811,7 +9119,7 @@
         </p:nvSpPr>
         <p:spPr>
           <a:xfrm>
-            <a:off x="304801" y="369651"/>
+            <a:off x="295073" y="329119"/>
             <a:ext cx="11601855" cy="6199763"/>
           </a:xfrm>
           <a:prstGeom prst="rect">
@@ -8826,17 +9134,37 @@
           <a:p>
             <a:pPr marL="0" indent="0"/>
             <a:r>
-              <a:rPr lang="en-US" sz="4267" dirty="0" err="1"/>
-              <a:t>Prechorus</a:t>
-            </a:r>
-            <a:endParaRPr lang="en-US" sz="4267" dirty="0"/>
+              <a:rPr lang="en-US" sz="4267" dirty="0"/>
+              <a:t>Chorus </a:t>
+            </a:r>
+          </a:p>
+          <a:p>
+            <a:pPr marL="0" indent="0"/>
+            <a:r>
+              <a:rPr lang="en-US" sz="4267" dirty="0"/>
+              <a:t>All the power, all the glory</a:t>
+            </a:r>
+          </a:p>
+          <a:p>
+            <a:pPr marL="0" indent="0"/>
+            <a:r>
+              <a:rPr lang="en-US" sz="4267" dirty="0"/>
+              <a:t>I will trust in His name</a:t>
+            </a:r>
+          </a:p>
+          <a:p>
+            <a:pPr marL="0" indent="0"/>
+            <a:r>
+              <a:rPr lang="en-US" sz="4267" dirty="0"/>
+              <a:t>For my God is, the Ancient of Days</a:t>
+            </a:r>
           </a:p>
         </p:txBody>
       </p:sp>
     </p:spTree>
     <p:extLst>
       <p:ext uri="{BB962C8B-B14F-4D97-AF65-F5344CB8AC3E}">
-        <p14:creationId xmlns:p14="http://schemas.microsoft.com/office/powerpoint/2010/main" val="1346762501"/>
+        <p14:creationId xmlns:p14="http://schemas.microsoft.com/office/powerpoint/2010/main" val="3028788224"/>
       </p:ext>
     </p:extLst>
   </p:cSld>
@@ -8875,7 +9203,7 @@
         </p:nvSpPr>
         <p:spPr>
           <a:xfrm>
-            <a:off x="295073" y="329119"/>
+            <a:off x="304801" y="369651"/>
             <a:ext cx="11601855" cy="6199763"/>
           </a:xfrm>
           <a:prstGeom prst="rect">
@@ -8891,7 +9219,35 @@
             <a:pPr marL="0" indent="0"/>
             <a:r>
               <a:rPr lang="en-US" sz="4267" dirty="0"/>
-              <a:t>Chorus </a:t>
+              <a:t>Verse 2</a:t>
+            </a:r>
+          </a:p>
+          <a:p>
+            <a:pPr marL="0" indent="0"/>
+            <a:r>
+              <a:rPr lang="en-US" sz="4267" dirty="0"/>
+              <a:t>Though the dread of night overwhelms my soul</a:t>
+            </a:r>
+          </a:p>
+          <a:p>
+            <a:pPr marL="0" indent="0"/>
+            <a:r>
+              <a:rPr lang="en-US" sz="4267" dirty="0"/>
+              <a:t>He is here with me, I am not alone</a:t>
+            </a:r>
+          </a:p>
+          <a:p>
+            <a:pPr marL="0" indent="0"/>
+            <a:r>
+              <a:rPr lang="en-US" sz="4267" dirty="0"/>
+              <a:t>O His love is sure, and He knows my name</a:t>
+            </a:r>
+          </a:p>
+          <a:p>
+            <a:pPr marL="0" indent="0"/>
+            <a:r>
+              <a:rPr lang="en-US" sz="4267" dirty="0"/>
+              <a:t>For my God is, the Ancient of Days</a:t>
             </a:r>
           </a:p>
         </p:txBody>
@@ -8899,7 +9255,7 @@
     </p:spTree>
     <p:extLst>
       <p:ext uri="{BB962C8B-B14F-4D97-AF65-F5344CB8AC3E}">
-        <p14:creationId xmlns:p14="http://schemas.microsoft.com/office/powerpoint/2010/main" val="1616820011"/>
+        <p14:creationId xmlns:p14="http://schemas.microsoft.com/office/powerpoint/2010/main" val="1390980916"/>
       </p:ext>
     </p:extLst>
   </p:cSld>
@@ -8938,7 +9294,7 @@
         </p:nvSpPr>
         <p:spPr>
           <a:xfrm>
-            <a:off x="304801" y="369651"/>
+            <a:off x="295073" y="329119"/>
             <a:ext cx="11601855" cy="6199763"/>
           </a:xfrm>
           <a:prstGeom prst="rect">
@@ -8954,7 +9310,28 @@
             <a:pPr marL="0" indent="0"/>
             <a:r>
               <a:rPr lang="en-US" sz="4267" dirty="0"/>
-              <a:t>Verse 2</a:t>
+              <a:t>Chorus </a:t>
+            </a:r>
+          </a:p>
+          <a:p>
+            <a:pPr marL="0" indent="0"/>
+            <a:r>
+              <a:rPr lang="en-US" sz="4267" dirty="0"/>
+              <a:t>None above Him, none before Him</a:t>
+            </a:r>
+          </a:p>
+          <a:p>
+            <a:pPr marL="0" indent="0"/>
+            <a:r>
+              <a:rPr lang="en-US" sz="4267" dirty="0"/>
+              <a:t>All of time in His hands</a:t>
+            </a:r>
+          </a:p>
+          <a:p>
+            <a:pPr marL="0" indent="0"/>
+            <a:r>
+              <a:rPr lang="en-US" sz="4267" dirty="0"/>
+              <a:t>For His throne it shall remain and ever stand</a:t>
             </a:r>
           </a:p>
         </p:txBody>
@@ -8962,7 +9339,7 @@
     </p:spTree>
     <p:extLst>
       <p:ext uri="{BB962C8B-B14F-4D97-AF65-F5344CB8AC3E}">
-        <p14:creationId xmlns:p14="http://schemas.microsoft.com/office/powerpoint/2010/main" val="1390980916"/>
+        <p14:creationId xmlns:p14="http://schemas.microsoft.com/office/powerpoint/2010/main" val="1588433526"/>
       </p:ext>
     </p:extLst>
   </p:cSld>
@@ -9020,12 +9397,33 @@
               <a:t>Chorus </a:t>
             </a:r>
           </a:p>
+          <a:p>
+            <a:pPr marL="0" indent="0"/>
+            <a:r>
+              <a:rPr lang="en-US" sz="4267" dirty="0"/>
+              <a:t>All the power, all the glory</a:t>
+            </a:r>
+          </a:p>
+          <a:p>
+            <a:pPr marL="0" indent="0"/>
+            <a:r>
+              <a:rPr lang="en-US" sz="4267" dirty="0"/>
+              <a:t>I will trust in His name</a:t>
+            </a:r>
+          </a:p>
+          <a:p>
+            <a:pPr marL="0" indent="0"/>
+            <a:r>
+              <a:rPr lang="en-US" sz="4267" dirty="0"/>
+              <a:t>For my God is, the Ancient of Days</a:t>
+            </a:r>
+          </a:p>
         </p:txBody>
       </p:sp>
     </p:spTree>
     <p:extLst>
       <p:ext uri="{BB962C8B-B14F-4D97-AF65-F5344CB8AC3E}">
-        <p14:creationId xmlns:p14="http://schemas.microsoft.com/office/powerpoint/2010/main" val="3549348934"/>
+        <p14:creationId xmlns:p14="http://schemas.microsoft.com/office/powerpoint/2010/main" val="1677961385"/>
       </p:ext>
     </p:extLst>
   </p:cSld>
@@ -9081,6 +9479,42 @@
             <a:r>
               <a:rPr lang="en-US" sz="4267" dirty="0"/>
               <a:t>Bridge</a:t>
+            </a:r>
+          </a:p>
+          <a:p>
+            <a:pPr marL="0" indent="0"/>
+            <a:r>
+              <a:rPr lang="en-US" sz="4267" dirty="0"/>
+              <a:t>Though I may not see what the future brings</a:t>
+            </a:r>
+          </a:p>
+          <a:p>
+            <a:pPr marL="0" indent="0"/>
+            <a:r>
+              <a:rPr lang="en-US" sz="4267" dirty="0"/>
+              <a:t>I will watch and wait for the </a:t>
+            </a:r>
+            <a:r>
+              <a:rPr lang="en-US" sz="4267" dirty="0" err="1"/>
+              <a:t>Saviour</a:t>
+            </a:r>
+            <a:r>
+              <a:rPr lang="en-US" sz="4267" dirty="0"/>
+              <a:t> King</a:t>
+            </a:r>
+          </a:p>
+          <a:p>
+            <a:pPr marL="0" indent="0"/>
+            <a:r>
+              <a:rPr lang="en-US" sz="4267" dirty="0"/>
+              <a:t>Then my joy complete standing face to face</a:t>
+            </a:r>
+          </a:p>
+          <a:p>
+            <a:pPr marL="0" indent="0"/>
+            <a:r>
+              <a:rPr lang="en-US" sz="4267" dirty="0"/>
+              <a:t>In the presence of the Ancient of Days</a:t>
             </a:r>
           </a:p>
         </p:txBody>
@@ -9143,7 +9577,28 @@
             <a:pPr marL="0" indent="0"/>
             <a:r>
               <a:rPr lang="en-US" sz="4267" dirty="0"/>
-              <a:t>Chorus</a:t>
+              <a:t>Chorus </a:t>
+            </a:r>
+          </a:p>
+          <a:p>
+            <a:pPr marL="0" indent="0"/>
+            <a:r>
+              <a:rPr lang="en-US" sz="4267" dirty="0"/>
+              <a:t>None above Him, none before Him</a:t>
+            </a:r>
+          </a:p>
+          <a:p>
+            <a:pPr marL="0" indent="0"/>
+            <a:r>
+              <a:rPr lang="en-US" sz="4267" dirty="0"/>
+              <a:t>All of time in His hands</a:t>
+            </a:r>
+          </a:p>
+          <a:p>
+            <a:pPr marL="0" indent="0"/>
+            <a:r>
+              <a:rPr lang="en-US" sz="4267" dirty="0"/>
+              <a:t>For His throne it shall remain and ever stand</a:t>
             </a:r>
           </a:p>
         </p:txBody>
@@ -9151,7 +9606,7 @@
     </p:spTree>
     <p:extLst>
       <p:ext uri="{BB962C8B-B14F-4D97-AF65-F5344CB8AC3E}">
-        <p14:creationId xmlns:p14="http://schemas.microsoft.com/office/powerpoint/2010/main" val="3345127143"/>
+        <p14:creationId xmlns:p14="http://schemas.microsoft.com/office/powerpoint/2010/main" val="1023843805"/>
       </p:ext>
     </p:extLst>
   </p:cSld>

</xml_diff>